<commit_message>
improves javadoc, sets some debug flags to false and fixes https to http to avoid javas horrible SSL behavior
</commit_message>
<xml_diff>
--- a/simplegraph-powerpoint/QueenVictoria.pptx
+++ b/simplegraph-powerpoint/QueenVictoria.pptx
@@ -6133,7 +6133,7 @@
                 </a:solidFill>
                 <a:hlinkClick r:id="rId2" tooltip="https://tools.wmflabs.org/sqid/#/view?id=Q9439"/>
               </a:rPr>
-              <a:t>Queen Victoria</a:t>
+              <a:t>Victoria</a:t>
             </a:r>
           </a:p>
         </p:txBody>
@@ -6971,7 +6971,7 @@
                   <a:srgbClr val="0000FF"/>
                 </a:solidFill>
               </a:rPr>
-              <a:t>Queen Victoria</a:t>
+              <a:t>Victoria</a:t>
             </a:r>
           </a:p>
         </p:txBody>

</xml_diff>